<commit_message>
Add docker to WWW
</commit_message>
<xml_diff>
--- a/subjects/WWW/Bazy danych - 3 zajęcia.pptx
+++ b/subjects/WWW/Bazy danych - 3 zajęcia.pptx
@@ -5,25 +5,26 @@
     <p:sldMasterId id="2147483720" r:id="rId1"/>
   </p:sldMasterIdLst>
   <p:notesMasterIdLst>
-    <p:notesMasterId r:id="rId18"/>
+    <p:notesMasterId r:id="rId19"/>
   </p:notesMasterIdLst>
   <p:sldIdLst>
     <p:sldId id="381" r:id="rId2"/>
-    <p:sldId id="337" r:id="rId3"/>
-    <p:sldId id="382" r:id="rId4"/>
-    <p:sldId id="294" r:id="rId5"/>
-    <p:sldId id="383" r:id="rId6"/>
-    <p:sldId id="384" r:id="rId7"/>
-    <p:sldId id="386" r:id="rId8"/>
-    <p:sldId id="295" r:id="rId9"/>
-    <p:sldId id="387" r:id="rId10"/>
-    <p:sldId id="388" r:id="rId11"/>
-    <p:sldId id="389" r:id="rId12"/>
-    <p:sldId id="390" r:id="rId13"/>
-    <p:sldId id="391" r:id="rId14"/>
-    <p:sldId id="392" r:id="rId15"/>
-    <p:sldId id="393" r:id="rId16"/>
-    <p:sldId id="394" r:id="rId17"/>
+    <p:sldId id="395" r:id="rId3"/>
+    <p:sldId id="337" r:id="rId4"/>
+    <p:sldId id="382" r:id="rId5"/>
+    <p:sldId id="294" r:id="rId6"/>
+    <p:sldId id="383" r:id="rId7"/>
+    <p:sldId id="384" r:id="rId8"/>
+    <p:sldId id="386" r:id="rId9"/>
+    <p:sldId id="295" r:id="rId10"/>
+    <p:sldId id="387" r:id="rId11"/>
+    <p:sldId id="388" r:id="rId12"/>
+    <p:sldId id="389" r:id="rId13"/>
+    <p:sldId id="390" r:id="rId14"/>
+    <p:sldId id="391" r:id="rId15"/>
+    <p:sldId id="392" r:id="rId16"/>
+    <p:sldId id="393" r:id="rId17"/>
+    <p:sldId id="394" r:id="rId18"/>
   </p:sldIdLst>
   <p:sldSz cx="12192000" cy="6858000"/>
   <p:notesSz cx="6858000" cy="9144000"/>
@@ -134,6 +135,7 @@
 <p1510:revInfo xmlns:a="http://schemas.openxmlformats.org/drawingml/2006/main" xmlns:r="http://schemas.openxmlformats.org/officeDocument/2006/relationships" xmlns:p1510="http://schemas.microsoft.com/office/powerpoint/2015/10/main">
   <p1510:revLst>
     <p1510:client id="{3298C733-EA56-44BD-B82F-19114443C032}" v="336" dt="2024-02-04T13:37:50.064"/>
+    <p1510:client id="{A7DD14BE-6490-4875-BD4F-854267FDE401}" v="7" dt="2024-02-04T15:05:00.669"/>
   </p1510:revLst>
 </p1510:revInfo>
 </file>
@@ -183,6 +185,70 @@
             <ac:spMk id="38" creationId="{3D572980-FB84-8C29-1FAC-FAC5ECE29A39}"/>
           </ac:spMkLst>
         </pc:spChg>
+      </pc:sldChg>
+    </pc:docChg>
+  </pc:docChgLst>
+  <pc:docChgLst>
+    <pc:chgData name="Patryk Serafin" userId="86fa742248e137ce" providerId="LiveId" clId="{A7DD14BE-6490-4875-BD4F-854267FDE401}"/>
+    <pc:docChg chg="undo custSel modSld">
+      <pc:chgData name="Patryk Serafin" userId="86fa742248e137ce" providerId="LiveId" clId="{A7DD14BE-6490-4875-BD4F-854267FDE401}" dt="2024-02-04T15:05:06.997" v="75" actId="207"/>
+      <pc:docMkLst>
+        <pc:docMk/>
+      </pc:docMkLst>
+      <pc:sldChg chg="addSp delSp modSp mod modClrScheme delDesignElem chgLayout">
+        <pc:chgData name="Patryk Serafin" userId="86fa742248e137ce" providerId="LiveId" clId="{A7DD14BE-6490-4875-BD4F-854267FDE401}" dt="2024-02-04T15:05:06.997" v="75" actId="207"/>
+        <pc:sldMkLst>
+          <pc:docMk/>
+          <pc:sldMk cId="3988112222" sldId="395"/>
+        </pc:sldMkLst>
+        <pc:spChg chg="add mod ord">
+          <ac:chgData name="Patryk Serafin" userId="86fa742248e137ce" providerId="LiveId" clId="{A7DD14BE-6490-4875-BD4F-854267FDE401}" dt="2024-02-04T15:05:06.997" v="75" actId="207"/>
+          <ac:spMkLst>
+            <pc:docMk/>
+            <pc:sldMk cId="3988112222" sldId="395"/>
+            <ac:spMk id="2" creationId="{7CDDAC03-3C72-8C10-624C-CB3852F6B48A}"/>
+          </ac:spMkLst>
+        </pc:spChg>
+        <pc:spChg chg="mod ord">
+          <ac:chgData name="Patryk Serafin" userId="86fa742248e137ce" providerId="LiveId" clId="{A7DD14BE-6490-4875-BD4F-854267FDE401}" dt="2024-02-04T14:41:49.776" v="63" actId="26606"/>
+          <ac:spMkLst>
+            <pc:docMk/>
+            <pc:sldMk cId="3988112222" sldId="395"/>
+            <ac:spMk id="4" creationId="{6E9A2A65-00C3-33BB-E75F-94A3160CBDDE}"/>
+          </ac:spMkLst>
+        </pc:spChg>
+        <pc:spChg chg="add">
+          <ac:chgData name="Patryk Serafin" userId="86fa742248e137ce" providerId="LiveId" clId="{A7DD14BE-6490-4875-BD4F-854267FDE401}" dt="2024-02-04T14:41:49.776" v="63" actId="26606"/>
+          <ac:spMkLst>
+            <pc:docMk/>
+            <pc:sldMk cId="3988112222" sldId="395"/>
+            <ac:spMk id="13" creationId="{92CC1E4F-F1F0-B945-BE50-C72A7103E8AC}"/>
+          </ac:spMkLst>
+        </pc:spChg>
+        <pc:spChg chg="del">
+          <ac:chgData name="Patryk Serafin" userId="86fa742248e137ce" providerId="LiveId" clId="{A7DD14BE-6490-4875-BD4F-854267FDE401}" dt="2024-02-04T14:41:00.532" v="0" actId="700"/>
+          <ac:spMkLst>
+            <pc:docMk/>
+            <pc:sldMk cId="3988112222" sldId="395"/>
+            <ac:spMk id="16" creationId="{5CCC8701-8539-5E64-EF30-C70389E5B25F}"/>
+          </ac:spMkLst>
+        </pc:spChg>
+        <pc:spChg chg="del">
+          <ac:chgData name="Patryk Serafin" userId="86fa742248e137ce" providerId="LiveId" clId="{A7DD14BE-6490-4875-BD4F-854267FDE401}" dt="2024-02-04T14:41:00.532" v="0" actId="700"/>
+          <ac:spMkLst>
+            <pc:docMk/>
+            <pc:sldMk cId="3988112222" sldId="395"/>
+            <ac:spMk id="18" creationId="{7A681C60-5AC1-92F7-E1AD-BD2720FA18DE}"/>
+          </ac:spMkLst>
+        </pc:spChg>
+        <pc:picChg chg="mod ord">
+          <ac:chgData name="Patryk Serafin" userId="86fa742248e137ce" providerId="LiveId" clId="{A7DD14BE-6490-4875-BD4F-854267FDE401}" dt="2024-02-04T14:41:49.776" v="63" actId="26606"/>
+          <ac:picMkLst>
+            <pc:docMk/>
+            <pc:sldMk cId="3988112222" sldId="395"/>
+            <ac:picMk id="8" creationId="{A412D5D6-9873-DDA3-8438-227B1E7A53DC}"/>
+          </ac:picMkLst>
+        </pc:picChg>
       </pc:sldChg>
     </pc:docChg>
   </pc:docChgLst>
@@ -6303,7 +6369,7 @@
                 <a:tabLst/>
                 <a:defRPr/>
               </a:pPr>
-              <a:t>6</a:t>
+              <a:t>7</a:t>
             </a:fld>
             <a:endParaRPr kumimoji="0" lang="pl-PL" sz="1200" b="0" i="0" u="none" strike="noStrike" kern="1200" cap="none" spc="0" normalizeH="0" baseline="0" noProof="0">
               <a:ln>
@@ -6471,7 +6537,7 @@
                 <a:tabLst/>
                 <a:defRPr/>
               </a:pPr>
-              <a:t>7</a:t>
+              <a:t>8</a:t>
             </a:fld>
             <a:endParaRPr kumimoji="0" lang="pl-PL" sz="1200" b="0" i="0" u="none" strike="noStrike" kern="1200" cap="none" spc="0" normalizeH="0" baseline="0" noProof="0">
               <a:ln>
@@ -6639,7 +6705,7 @@
                 <a:tabLst/>
                 <a:defRPr/>
               </a:pPr>
-              <a:t>10</a:t>
+              <a:t>11</a:t>
             </a:fld>
             <a:endParaRPr kumimoji="0" lang="pl-PL" sz="1200" b="0" i="0" u="none" strike="noStrike" kern="1200" cap="none" spc="0" normalizeH="0" baseline="0" noProof="0">
               <a:ln>
@@ -6807,7 +6873,7 @@
                 <a:tabLst/>
                 <a:defRPr/>
               </a:pPr>
-              <a:t>11</a:t>
+              <a:t>12</a:t>
             </a:fld>
             <a:endParaRPr kumimoji="0" lang="pl-PL" sz="1200" b="0" i="0" u="none" strike="noStrike" kern="1200" cap="none" spc="0" normalizeH="0" baseline="0" noProof="0">
               <a:ln>
@@ -6975,7 +7041,7 @@
                 <a:tabLst/>
                 <a:defRPr/>
               </a:pPr>
-              <a:t>14</a:t>
+              <a:t>15</a:t>
             </a:fld>
             <a:endParaRPr kumimoji="0" lang="pl-PL" sz="1200" b="0" i="0" u="none" strike="noStrike" kern="1200" cap="none" spc="0" normalizeH="0" baseline="0" noProof="0">
               <a:ln>
@@ -7143,7 +7209,7 @@
                 <a:tabLst/>
                 <a:defRPr/>
               </a:pPr>
-              <a:t>15</a:t>
+              <a:t>16</a:t>
             </a:fld>
             <a:endParaRPr kumimoji="0" lang="pl-PL" sz="1200" b="0" i="0" u="none" strike="noStrike" kern="1200" cap="none" spc="0" normalizeH="0" baseline="0" noProof="0">
               <a:ln>
@@ -10809,6 +10875,163 @@
         <p:cNvPr id="1" name="">
           <a:extLst>
             <a:ext uri="{FF2B5EF4-FFF2-40B4-BE49-F238E27FC236}">
+              <a16:creationId xmlns:a16="http://schemas.microsoft.com/office/drawing/2014/main" id="{61F12EEF-C9B5-A815-79A0-DBF6EED7C241}"/>
+            </a:ext>
+          </a:extLst>
+        </p:cNvPr>
+        <p:cNvGrpSpPr/>
+        <p:nvPr/>
+      </p:nvGrpSpPr>
+      <p:grpSpPr>
+        <a:xfrm>
+          <a:off x="0" y="0"/>
+          <a:ext cx="0" cy="0"/>
+          <a:chOff x="0" y="0"/>
+          <a:chExt cx="0" cy="0"/>
+        </a:xfrm>
+      </p:grpSpPr>
+      <p:sp>
+        <p:nvSpPr>
+          <p:cNvPr id="2" name="Tytuł 1">
+            <a:extLst>
+              <a:ext uri="{FF2B5EF4-FFF2-40B4-BE49-F238E27FC236}">
+                <a16:creationId xmlns:a16="http://schemas.microsoft.com/office/drawing/2014/main" id="{D607122B-26B4-0159-CD26-8A6E7B1FD002}"/>
+              </a:ext>
+            </a:extLst>
+          </p:cNvPr>
+          <p:cNvSpPr>
+            <a:spLocks noGrp="1"/>
+          </p:cNvSpPr>
+          <p:nvPr>
+            <p:ph type="title"/>
+          </p:nvPr>
+        </p:nvSpPr>
+        <p:spPr>
+          <a:xfrm>
+            <a:off x="6796844" y="474333"/>
+            <a:ext cx="4563883" cy="2146300"/>
+          </a:xfrm>
+        </p:spPr>
+        <p:txBody>
+          <a:bodyPr vert="horz" lIns="91440" tIns="45720" rIns="91440" bIns="45720" rtlCol="0" anchor="b">
+            <a:normAutofit/>
+          </a:bodyPr>
+          <a:lstStyle/>
+          <a:p>
+            <a:r>
+              <a:rPr lang="pl-PL" dirty="0"/>
+              <a:t>FROM-WHERE</a:t>
+            </a:r>
+            <a:endParaRPr lang="en-US" b="0" i="1" spc="300" dirty="0"/>
+          </a:p>
+        </p:txBody>
+      </p:sp>
+      <p:pic>
+        <p:nvPicPr>
+          <p:cNvPr id="7" name="Picture 4" descr="Top view of cubes connected with black lines">
+            <a:extLst>
+              <a:ext uri="{FF2B5EF4-FFF2-40B4-BE49-F238E27FC236}">
+                <a16:creationId xmlns:a16="http://schemas.microsoft.com/office/drawing/2014/main" id="{D09109F0-59C5-C6D8-B77A-19C76A3E995B}"/>
+              </a:ext>
+            </a:extLst>
+          </p:cNvPr>
+          <p:cNvPicPr>
+            <a:picLocks noChangeAspect="1"/>
+          </p:cNvPicPr>
+          <p:nvPr/>
+        </p:nvPicPr>
+        <p:blipFill rotWithShape="1">
+          <a:blip r:embed="rId2"/>
+          <a:srcRect l="16667" r="16667"/>
+          <a:stretch/>
+        </p:blipFill>
+        <p:spPr>
+          <a:xfrm>
+            <a:off x="20" y="10"/>
+            <a:ext cx="6095979" cy="6857990"/>
+          </a:xfrm>
+          <a:prstGeom prst="rect">
+            <a:avLst/>
+          </a:prstGeom>
+        </p:spPr>
+      </p:pic>
+      <p:sp>
+        <p:nvSpPr>
+          <p:cNvPr id="3" name="Symbol zastępczy zawartości 2">
+            <a:extLst>
+              <a:ext uri="{FF2B5EF4-FFF2-40B4-BE49-F238E27FC236}">
+                <a16:creationId xmlns:a16="http://schemas.microsoft.com/office/drawing/2014/main" id="{7128926A-A42F-EA80-C1F8-C721A6854E40}"/>
+              </a:ext>
+            </a:extLst>
+          </p:cNvPr>
+          <p:cNvSpPr>
+            <a:spLocks noGrp="1"/>
+          </p:cNvSpPr>
+          <p:nvPr>
+            <p:ph idx="1"/>
+          </p:nvPr>
+        </p:nvSpPr>
+        <p:spPr>
+          <a:xfrm>
+            <a:off x="6796844" y="2767953"/>
+            <a:ext cx="4563883" cy="3461013"/>
+          </a:xfrm>
+        </p:spPr>
+        <p:txBody>
+          <a:bodyPr vert="horz" lIns="91440" tIns="45720" rIns="91440" bIns="45720" rtlCol="0">
+            <a:normAutofit/>
+          </a:bodyPr>
+          <a:lstStyle/>
+          <a:p>
+            <a:pPr>
+              <a:lnSpc>
+                <a:spcPct val="110000"/>
+              </a:lnSpc>
+            </a:pPr>
+            <a:r>
+              <a:rPr lang="pl-PL" sz="1800" dirty="0"/>
+              <a:t>Klauzula </a:t>
+            </a:r>
+            <a:r>
+              <a:rPr lang="pl-PL" sz="1800" b="1" dirty="0"/>
+              <a:t>„FROM”</a:t>
+            </a:r>
+            <a:r>
+              <a:rPr lang="pl-PL" sz="1800" dirty="0"/>
+              <a:t> określa z której tabeli (lub tabel) baza danych ma pobrać dane. Klauzula </a:t>
+            </a:r>
+            <a:r>
+              <a:rPr lang="pl-PL" sz="1800" b="1" dirty="0"/>
+              <a:t>„WHERE”</a:t>
+            </a:r>
+            <a:r>
+              <a:rPr lang="pl-PL" sz="1800" dirty="0"/>
+              <a:t> jest używana do filtrowania rekordów zgodnie z określonym kryterium.</a:t>
+            </a:r>
+          </a:p>
+        </p:txBody>
+      </p:sp>
+    </p:spTree>
+    <p:extLst>
+      <p:ext uri="{BB962C8B-B14F-4D97-AF65-F5344CB8AC3E}">
+        <p14:creationId xmlns:p14="http://schemas.microsoft.com/office/powerpoint/2010/main" val="2913523551"/>
+      </p:ext>
+    </p:extLst>
+  </p:cSld>
+  <p:clrMapOvr>
+    <a:masterClrMapping/>
+  </p:clrMapOvr>
+</p:sld>
+</file>
+
+<file path=ppt/slides/slide11.xml><?xml version="1.0" encoding="utf-8"?>
+<p:sld xmlns:a="http://schemas.openxmlformats.org/drawingml/2006/main" xmlns:r="http://schemas.openxmlformats.org/officeDocument/2006/relationships" xmlns:p="http://schemas.openxmlformats.org/presentationml/2006/main">
+  <p:cSld>
+    <p:spTree>
+      <p:nvGrpSpPr>
+        <p:cNvPr id="1" name="">
+          <a:extLst>
+            <a:ext uri="{FF2B5EF4-FFF2-40B4-BE49-F238E27FC236}">
               <a16:creationId xmlns:a16="http://schemas.microsoft.com/office/drawing/2014/main" id="{BBCD70CD-72A7-FD16-2358-6BA333B469F7}"/>
             </a:ext>
           </a:extLst>
@@ -10989,7 +11212,7 @@
 </p:sld>
 </file>
 
-<file path=ppt/slides/slide11.xml><?xml version="1.0" encoding="utf-8"?>
+<file path=ppt/slides/slide12.xml><?xml version="1.0" encoding="utf-8"?>
 <p:sld xmlns:a="http://schemas.openxmlformats.org/drawingml/2006/main" xmlns:r="http://schemas.openxmlformats.org/officeDocument/2006/relationships" xmlns:p="http://schemas.openxmlformats.org/presentationml/2006/main">
   <p:cSld>
     <p:spTree>
@@ -11200,7 +11423,7 @@
 </p:sld>
 </file>
 
-<file path=ppt/slides/slide12.xml><?xml version="1.0" encoding="utf-8"?>
+<file path=ppt/slides/slide13.xml><?xml version="1.0" encoding="utf-8"?>
 <p:sld xmlns:a="http://schemas.openxmlformats.org/drawingml/2006/main" xmlns:r="http://schemas.openxmlformats.org/officeDocument/2006/relationships" xmlns:p="http://schemas.openxmlformats.org/presentationml/2006/main">
   <p:cSld>
     <p:bg>
@@ -11523,7 +11746,7 @@
 </p:sld>
 </file>
 
-<file path=ppt/slides/slide13.xml><?xml version="1.0" encoding="utf-8"?>
+<file path=ppt/slides/slide14.xml><?xml version="1.0" encoding="utf-8"?>
 <p:sld xmlns:a="http://schemas.openxmlformats.org/drawingml/2006/main" xmlns:r="http://schemas.openxmlformats.org/officeDocument/2006/relationships" xmlns:p="http://schemas.openxmlformats.org/presentationml/2006/main">
   <p:cSld>
     <p:spTree>
@@ -11672,7 +11895,7 @@
 </p:sld>
 </file>
 
-<file path=ppt/slides/slide14.xml><?xml version="1.0" encoding="utf-8"?>
+<file path=ppt/slides/slide15.xml><?xml version="1.0" encoding="utf-8"?>
 <p:sld xmlns:a="http://schemas.openxmlformats.org/drawingml/2006/main" xmlns:r="http://schemas.openxmlformats.org/officeDocument/2006/relationships" xmlns:p="http://schemas.openxmlformats.org/presentationml/2006/main">
   <p:cSld>
     <p:spTree>
@@ -11888,7 +12111,7 @@
 </p:sld>
 </file>
 
-<file path=ppt/slides/slide15.xml><?xml version="1.0" encoding="utf-8"?>
+<file path=ppt/slides/slide16.xml><?xml version="1.0" encoding="utf-8"?>
 <p:sld xmlns:a="http://schemas.openxmlformats.org/drawingml/2006/main" xmlns:r="http://schemas.openxmlformats.org/officeDocument/2006/relationships" xmlns:p="http://schemas.openxmlformats.org/presentationml/2006/main">
   <p:cSld>
     <p:spTree>
@@ -12119,7 +12342,7 @@
 </p:sld>
 </file>
 
-<file path=ppt/slides/slide16.xml><?xml version="1.0" encoding="utf-8"?>
+<file path=ppt/slides/slide17.xml><?xml version="1.0" encoding="utf-8"?>
 <p:sld xmlns:a="http://schemas.openxmlformats.org/drawingml/2006/main" xmlns:r="http://schemas.openxmlformats.org/officeDocument/2006/relationships" xmlns:p="http://schemas.openxmlformats.org/presentationml/2006/main">
   <p:cSld>
     <p:spTree>
@@ -12281,6 +12504,316 @@
 </file>
 
 <file path=ppt/slides/slide2.xml><?xml version="1.0" encoding="utf-8"?>
+<p:sld xmlns:a="http://schemas.openxmlformats.org/drawingml/2006/main" xmlns:r="http://schemas.openxmlformats.org/officeDocument/2006/relationships" xmlns:p="http://schemas.openxmlformats.org/presentationml/2006/main">
+  <p:cSld>
+    <p:bg>
+      <p:bgPr>
+        <a:solidFill>
+          <a:schemeClr val="bg1"/>
+        </a:solidFill>
+        <a:effectLst/>
+      </p:bgPr>
+    </p:bg>
+    <p:spTree>
+      <p:nvGrpSpPr>
+        <p:cNvPr id="1" name="">
+          <a:extLst>
+            <a:ext uri="{FF2B5EF4-FFF2-40B4-BE49-F238E27FC236}">
+              <a16:creationId xmlns:a16="http://schemas.microsoft.com/office/drawing/2014/main" id="{E6A247CD-BA44-A115-A25F-D853416195DC}"/>
+            </a:ext>
+          </a:extLst>
+        </p:cNvPr>
+        <p:cNvGrpSpPr/>
+        <p:nvPr/>
+      </p:nvGrpSpPr>
+      <p:grpSpPr>
+        <a:xfrm>
+          <a:off x="0" y="0"/>
+          <a:ext cx="0" cy="0"/>
+          <a:chOff x="0" y="0"/>
+          <a:chExt cx="0" cy="0"/>
+        </a:xfrm>
+      </p:grpSpPr>
+      <p:sp>
+        <p:nvSpPr>
+          <p:cNvPr id="13" name="Rectangle 12">
+            <a:extLst>
+              <a:ext uri="{FF2B5EF4-FFF2-40B4-BE49-F238E27FC236}">
+                <a16:creationId xmlns:a16="http://schemas.microsoft.com/office/drawing/2014/main" id="{92CC1E4F-F1F0-B945-BE50-C72A7103E8AC}"/>
+              </a:ext>
+              <a:ext uri="{C183D7F6-B498-43B3-948B-1728B52AA6E4}">
+                <adec:decorative xmlns:adec="http://schemas.microsoft.com/office/drawing/2017/decorative" val="1"/>
+              </a:ext>
+            </a:extLst>
+          </p:cNvPr>
+          <p:cNvSpPr>
+            <a:spLocks noGrp="1" noRot="1" noChangeAspect="1" noMove="1" noResize="1" noEditPoints="1" noAdjustHandles="1" noChangeArrowheads="1" noChangeShapeType="1" noTextEdit="1"/>
+          </p:cNvSpPr>
+          <p:nvPr>
+            <p:extLst>
+              <p:ext uri="{386F3935-93C4-4BCD-93E2-E3B085C9AB24}">
+                <p16:designElem xmlns:p16="http://schemas.microsoft.com/office/powerpoint/2015/main" val="1"/>
+              </p:ext>
+            </p:extLst>
+          </p:nvPr>
+        </p:nvSpPr>
+        <p:spPr>
+          <a:xfrm>
+            <a:off x="0" y="0"/>
+            <a:ext cx="12192000" cy="6858000"/>
+          </a:xfrm>
+          <a:prstGeom prst="rect">
+            <a:avLst/>
+          </a:prstGeom>
+          <a:solidFill>
+            <a:schemeClr val="bg1"/>
+          </a:solidFill>
+          <a:ln w="12700" cap="flat" cmpd="sng" algn="ctr">
+            <a:noFill/>
+            <a:prstDash val="solid"/>
+            <a:miter lim="800000"/>
+          </a:ln>
+          <a:effectLst/>
+          <a:extLst>
+            <a:ext uri="{91240B29-F687-4F45-9708-019B960494DF}">
+              <a14:hiddenLine xmlns:a14="http://schemas.microsoft.com/office/drawing/2010/main" w="12700" cap="flat" cmpd="sng" algn="ctr">
+                <a:solidFill>
+                  <a:schemeClr val="accent1">
+                    <a:shade val="15000"/>
+                  </a:schemeClr>
+                </a:solidFill>
+                <a:prstDash val="solid"/>
+                <a:miter lim="800000"/>
+              </a14:hiddenLine>
+            </a:ext>
+          </a:extLst>
+        </p:spPr>
+        <p:style>
+          <a:lnRef idx="2">
+            <a:schemeClr val="accent1">
+              <a:shade val="15000"/>
+            </a:schemeClr>
+          </a:lnRef>
+          <a:fillRef idx="1">
+            <a:schemeClr val="accent1"/>
+          </a:fillRef>
+          <a:effectRef idx="0">
+            <a:schemeClr val="accent1"/>
+          </a:effectRef>
+          <a:fontRef idx="minor">
+            <a:schemeClr val="lt1"/>
+          </a:fontRef>
+        </p:style>
+        <p:txBody>
+          <a:bodyPr rtlCol="0" anchor="ctr"/>
+          <a:lstStyle/>
+          <a:p>
+            <a:pPr algn="ctr"/>
+            <a:endParaRPr lang="en-US"/>
+          </a:p>
+        </p:txBody>
+      </p:sp>
+      <p:sp>
+        <p:nvSpPr>
+          <p:cNvPr id="4" name="Tytuł 3">
+            <a:extLst>
+              <a:ext uri="{FF2B5EF4-FFF2-40B4-BE49-F238E27FC236}">
+                <a16:creationId xmlns:a16="http://schemas.microsoft.com/office/drawing/2014/main" id="{6E9A2A65-00C3-33BB-E75F-94A3160CBDDE}"/>
+              </a:ext>
+            </a:extLst>
+          </p:cNvPr>
+          <p:cNvSpPr>
+            <a:spLocks noGrp="1"/>
+          </p:cNvSpPr>
+          <p:nvPr>
+            <p:ph type="title"/>
+          </p:nvPr>
+        </p:nvSpPr>
+        <p:spPr>
+          <a:xfrm>
+            <a:off x="6796844" y="474333"/>
+            <a:ext cx="4563883" cy="2146300"/>
+          </a:xfrm>
+        </p:spPr>
+        <p:txBody>
+          <a:bodyPr vert="horz" lIns="91440" tIns="45720" rIns="91440" bIns="45720" rtlCol="0" anchor="b">
+            <a:normAutofit/>
+          </a:bodyPr>
+          <a:lstStyle/>
+          <a:p>
+            <a:r>
+              <a:rPr lang="pl-PL"/>
+              <a:t>WEJŚCIÓWKA</a:t>
+            </a:r>
+            <a:endParaRPr lang="en-US" dirty="0"/>
+          </a:p>
+        </p:txBody>
+      </p:sp>
+      <p:pic>
+        <p:nvPicPr>
+          <p:cNvPr id="8" name="Picture 5" descr="Obraz zawierający w pomieszczeniu, światło&#10;&#10;Opis wygenerowany automatycznie przy średnim poziomie pewności">
+            <a:extLst>
+              <a:ext uri="{FF2B5EF4-FFF2-40B4-BE49-F238E27FC236}">
+                <a16:creationId xmlns:a16="http://schemas.microsoft.com/office/drawing/2014/main" id="{A412D5D6-9873-DDA3-8438-227B1E7A53DC}"/>
+              </a:ext>
+            </a:extLst>
+          </p:cNvPr>
+          <p:cNvPicPr>
+            <a:picLocks noChangeAspect="1"/>
+          </p:cNvPicPr>
+          <p:nvPr/>
+        </p:nvPicPr>
+        <p:blipFill rotWithShape="1">
+          <a:blip r:embed="rId2"/>
+          <a:srcRect l="26122" r="23878"/>
+          <a:stretch/>
+        </p:blipFill>
+        <p:spPr>
+          <a:xfrm>
+            <a:off x="20" y="10"/>
+            <a:ext cx="6095979" cy="6857990"/>
+          </a:xfrm>
+          <a:prstGeom prst="rect">
+            <a:avLst/>
+          </a:prstGeom>
+        </p:spPr>
+      </p:pic>
+      <p:sp>
+        <p:nvSpPr>
+          <p:cNvPr id="2" name="Symbol zastępczy zawartości 1">
+            <a:extLst>
+              <a:ext uri="{FF2B5EF4-FFF2-40B4-BE49-F238E27FC236}">
+                <a16:creationId xmlns:a16="http://schemas.microsoft.com/office/drawing/2014/main" id="{7CDDAC03-3C72-8C10-624C-CB3852F6B48A}"/>
+              </a:ext>
+            </a:extLst>
+          </p:cNvPr>
+          <p:cNvSpPr>
+            <a:spLocks noGrp="1"/>
+          </p:cNvSpPr>
+          <p:nvPr>
+            <p:ph idx="1"/>
+          </p:nvPr>
+        </p:nvSpPr>
+        <p:spPr>
+          <a:xfrm>
+            <a:off x="6796844" y="2767953"/>
+            <a:ext cx="4563883" cy="3461013"/>
+          </a:xfrm>
+        </p:spPr>
+        <p:txBody>
+          <a:bodyPr>
+            <a:normAutofit/>
+          </a:bodyPr>
+          <a:lstStyle/>
+          <a:p>
+            <a:pPr>
+              <a:lnSpc>
+                <a:spcPct val="110000"/>
+              </a:lnSpc>
+            </a:pPr>
+            <a:r>
+              <a:rPr lang="pl-PL" sz="1800" dirty="0"/>
+              <a:t>Grupa A:</a:t>
+            </a:r>
+          </a:p>
+          <a:p>
+            <a:pPr lvl="1">
+              <a:lnSpc>
+                <a:spcPct val="110000"/>
+              </a:lnSpc>
+            </a:pPr>
+            <a:r>
+              <a:rPr lang="pl-PL" dirty="0">
+                <a:hlinkClick r:id="rId3">
+                  <a:extLst>
+                    <a:ext uri="{A12FA001-AC4F-418D-AE19-62706E023703}">
+                      <ahyp:hlinkClr xmlns:ahyp="http://schemas.microsoft.com/office/drawing/2018/hyperlinkcolor" val="tx"/>
+                    </a:ext>
+                  </a:extLst>
+                </a:hlinkClick>
+              </a:rPr>
+              <a:t>https://shorturl.at/itILV</a:t>
+            </a:r>
+            <a:endParaRPr lang="pl-PL" dirty="0"/>
+          </a:p>
+          <a:p>
+            <a:pPr>
+              <a:lnSpc>
+                <a:spcPct val="110000"/>
+              </a:lnSpc>
+            </a:pPr>
+            <a:r>
+              <a:rPr lang="pl-PL" dirty="0"/>
+              <a:t>Grupa B:</a:t>
+            </a:r>
+          </a:p>
+          <a:p>
+            <a:pPr lvl="1">
+              <a:lnSpc>
+                <a:spcPct val="110000"/>
+              </a:lnSpc>
+            </a:pPr>
+            <a:r>
+              <a:rPr lang="pl-PL" dirty="0">
+                <a:hlinkClick r:id="rId4">
+                  <a:extLst>
+                    <a:ext uri="{A12FA001-AC4F-418D-AE19-62706E023703}">
+                      <ahyp:hlinkClr xmlns:ahyp="http://schemas.microsoft.com/office/drawing/2018/hyperlinkcolor" val="tx"/>
+                    </a:ext>
+                  </a:extLst>
+                </a:hlinkClick>
+              </a:rPr>
+              <a:t>https://shorturl.at/ajsEX</a:t>
+            </a:r>
+            <a:endParaRPr lang="pl-PL" dirty="0"/>
+          </a:p>
+          <a:p>
+            <a:pPr>
+              <a:lnSpc>
+                <a:spcPct val="110000"/>
+              </a:lnSpc>
+            </a:pPr>
+            <a:r>
+              <a:rPr lang="pl-PL" dirty="0"/>
+              <a:t>Grupa C:</a:t>
+            </a:r>
+          </a:p>
+          <a:p>
+            <a:pPr lvl="1">
+              <a:lnSpc>
+                <a:spcPct val="110000"/>
+              </a:lnSpc>
+            </a:pPr>
+            <a:r>
+              <a:rPr lang="pl-PL" dirty="0">
+                <a:hlinkClick r:id="rId5">
+                  <a:extLst>
+                    <a:ext uri="{A12FA001-AC4F-418D-AE19-62706E023703}">
+                      <ahyp:hlinkClr xmlns:ahyp="http://schemas.microsoft.com/office/drawing/2018/hyperlinkcolor" val="tx"/>
+                    </a:ext>
+                  </a:extLst>
+                </a:hlinkClick>
+              </a:rPr>
+              <a:t>https://shorturl.at/kqzRV</a:t>
+            </a:r>
+            <a:endParaRPr lang="pl-PL" dirty="0"/>
+          </a:p>
+        </p:txBody>
+      </p:sp>
+    </p:spTree>
+    <p:extLst>
+      <p:ext uri="{BB962C8B-B14F-4D97-AF65-F5344CB8AC3E}">
+        <p14:creationId xmlns:p14="http://schemas.microsoft.com/office/powerpoint/2010/main" val="3988112222"/>
+      </p:ext>
+    </p:extLst>
+  </p:cSld>
+  <p:clrMapOvr>
+    <a:masterClrMapping/>
+  </p:clrMapOvr>
+</p:sld>
+</file>
+
+<file path=ppt/slides/slide3.xml><?xml version="1.0" encoding="utf-8"?>
 <p:sld xmlns:a="http://schemas.openxmlformats.org/drawingml/2006/main" xmlns:r="http://schemas.openxmlformats.org/officeDocument/2006/relationships" xmlns:p="http://schemas.openxmlformats.org/presentationml/2006/main">
   <p:cSld>
     <p:bg>
@@ -12508,7 +13041,7 @@
 </p:sld>
 </file>
 
-<file path=ppt/slides/slide3.xml><?xml version="1.0" encoding="utf-8"?>
+<file path=ppt/slides/slide4.xml><?xml version="1.0" encoding="utf-8"?>
 <p:sld xmlns:a="http://schemas.openxmlformats.org/drawingml/2006/main" xmlns:r="http://schemas.openxmlformats.org/officeDocument/2006/relationships" xmlns:p="http://schemas.openxmlformats.org/presentationml/2006/main">
   <p:cSld>
     <p:spTree>
@@ -12660,7 +13193,7 @@
 </p:sld>
 </file>
 
-<file path=ppt/slides/slide4.xml><?xml version="1.0" encoding="utf-8"?>
+<file path=ppt/slides/slide5.xml><?xml version="1.0" encoding="utf-8"?>
 <p:sld xmlns:a="http://schemas.openxmlformats.org/drawingml/2006/main" xmlns:r="http://schemas.openxmlformats.org/officeDocument/2006/relationships" xmlns:p="http://schemas.openxmlformats.org/presentationml/2006/main">
   <p:cSld>
     <p:bg>
@@ -12914,7 +13447,7 @@
 </p:sld>
 </file>
 
-<file path=ppt/slides/slide5.xml><?xml version="1.0" encoding="utf-8"?>
+<file path=ppt/slides/slide6.xml><?xml version="1.0" encoding="utf-8"?>
 <p:sld xmlns:a="http://schemas.openxmlformats.org/drawingml/2006/main" xmlns:r="http://schemas.openxmlformats.org/officeDocument/2006/relationships" xmlns:p="http://schemas.openxmlformats.org/presentationml/2006/main">
   <p:cSld>
     <p:spTree>
@@ -13063,7 +13596,7 @@
 </p:sld>
 </file>
 
-<file path=ppt/slides/slide6.xml><?xml version="1.0" encoding="utf-8"?>
+<file path=ppt/slides/slide7.xml><?xml version="1.0" encoding="utf-8"?>
 <p:sld xmlns:a="http://schemas.openxmlformats.org/drawingml/2006/main" xmlns:r="http://schemas.openxmlformats.org/officeDocument/2006/relationships" xmlns:p="http://schemas.openxmlformats.org/presentationml/2006/main">
   <p:cSld>
     <p:spTree>
@@ -13232,7 +13765,7 @@
 </p:sld>
 </file>
 
-<file path=ppt/slides/slide7.xml><?xml version="1.0" encoding="utf-8"?>
+<file path=ppt/slides/slide8.xml><?xml version="1.0" encoding="utf-8"?>
 <p:sld xmlns:a="http://schemas.openxmlformats.org/drawingml/2006/main" xmlns:r="http://schemas.openxmlformats.org/officeDocument/2006/relationships" xmlns:p="http://schemas.openxmlformats.org/presentationml/2006/main">
   <p:cSld>
     <p:spTree>
@@ -13454,7 +13987,7 @@
 </p:sld>
 </file>
 
-<file path=ppt/slides/slide8.xml><?xml version="1.0" encoding="utf-8"?>
+<file path=ppt/slides/slide9.xml><?xml version="1.0" encoding="utf-8"?>
 <p:sld xmlns:a="http://schemas.openxmlformats.org/drawingml/2006/main" xmlns:r="http://schemas.openxmlformats.org/officeDocument/2006/relationships" xmlns:p="http://schemas.openxmlformats.org/presentationml/2006/main">
   <p:cSld>
     <p:bg>
@@ -13699,163 +14232,6 @@
     <p:extLst>
       <p:ext uri="{BB962C8B-B14F-4D97-AF65-F5344CB8AC3E}">
         <p14:creationId xmlns:p14="http://schemas.microsoft.com/office/powerpoint/2010/main" val="2488230557"/>
-      </p:ext>
-    </p:extLst>
-  </p:cSld>
-  <p:clrMapOvr>
-    <a:masterClrMapping/>
-  </p:clrMapOvr>
-</p:sld>
-</file>
-
-<file path=ppt/slides/slide9.xml><?xml version="1.0" encoding="utf-8"?>
-<p:sld xmlns:a="http://schemas.openxmlformats.org/drawingml/2006/main" xmlns:r="http://schemas.openxmlformats.org/officeDocument/2006/relationships" xmlns:p="http://schemas.openxmlformats.org/presentationml/2006/main">
-  <p:cSld>
-    <p:spTree>
-      <p:nvGrpSpPr>
-        <p:cNvPr id="1" name="">
-          <a:extLst>
-            <a:ext uri="{FF2B5EF4-FFF2-40B4-BE49-F238E27FC236}">
-              <a16:creationId xmlns:a16="http://schemas.microsoft.com/office/drawing/2014/main" id="{61F12EEF-C9B5-A815-79A0-DBF6EED7C241}"/>
-            </a:ext>
-          </a:extLst>
-        </p:cNvPr>
-        <p:cNvGrpSpPr/>
-        <p:nvPr/>
-      </p:nvGrpSpPr>
-      <p:grpSpPr>
-        <a:xfrm>
-          <a:off x="0" y="0"/>
-          <a:ext cx="0" cy="0"/>
-          <a:chOff x="0" y="0"/>
-          <a:chExt cx="0" cy="0"/>
-        </a:xfrm>
-      </p:grpSpPr>
-      <p:sp>
-        <p:nvSpPr>
-          <p:cNvPr id="2" name="Tytuł 1">
-            <a:extLst>
-              <a:ext uri="{FF2B5EF4-FFF2-40B4-BE49-F238E27FC236}">
-                <a16:creationId xmlns:a16="http://schemas.microsoft.com/office/drawing/2014/main" id="{D607122B-26B4-0159-CD26-8A6E7B1FD002}"/>
-              </a:ext>
-            </a:extLst>
-          </p:cNvPr>
-          <p:cNvSpPr>
-            <a:spLocks noGrp="1"/>
-          </p:cNvSpPr>
-          <p:nvPr>
-            <p:ph type="title"/>
-          </p:nvPr>
-        </p:nvSpPr>
-        <p:spPr>
-          <a:xfrm>
-            <a:off x="6796844" y="474333"/>
-            <a:ext cx="4563883" cy="2146300"/>
-          </a:xfrm>
-        </p:spPr>
-        <p:txBody>
-          <a:bodyPr vert="horz" lIns="91440" tIns="45720" rIns="91440" bIns="45720" rtlCol="0" anchor="b">
-            <a:normAutofit/>
-          </a:bodyPr>
-          <a:lstStyle/>
-          <a:p>
-            <a:r>
-              <a:rPr lang="pl-PL" dirty="0"/>
-              <a:t>FROM-WHERE</a:t>
-            </a:r>
-            <a:endParaRPr lang="en-US" b="0" i="1" spc="300" dirty="0"/>
-          </a:p>
-        </p:txBody>
-      </p:sp>
-      <p:pic>
-        <p:nvPicPr>
-          <p:cNvPr id="7" name="Picture 4" descr="Top view of cubes connected with black lines">
-            <a:extLst>
-              <a:ext uri="{FF2B5EF4-FFF2-40B4-BE49-F238E27FC236}">
-                <a16:creationId xmlns:a16="http://schemas.microsoft.com/office/drawing/2014/main" id="{D09109F0-59C5-C6D8-B77A-19C76A3E995B}"/>
-              </a:ext>
-            </a:extLst>
-          </p:cNvPr>
-          <p:cNvPicPr>
-            <a:picLocks noChangeAspect="1"/>
-          </p:cNvPicPr>
-          <p:nvPr/>
-        </p:nvPicPr>
-        <p:blipFill rotWithShape="1">
-          <a:blip r:embed="rId2"/>
-          <a:srcRect l="16667" r="16667"/>
-          <a:stretch/>
-        </p:blipFill>
-        <p:spPr>
-          <a:xfrm>
-            <a:off x="20" y="10"/>
-            <a:ext cx="6095979" cy="6857990"/>
-          </a:xfrm>
-          <a:prstGeom prst="rect">
-            <a:avLst/>
-          </a:prstGeom>
-        </p:spPr>
-      </p:pic>
-      <p:sp>
-        <p:nvSpPr>
-          <p:cNvPr id="3" name="Symbol zastępczy zawartości 2">
-            <a:extLst>
-              <a:ext uri="{FF2B5EF4-FFF2-40B4-BE49-F238E27FC236}">
-                <a16:creationId xmlns:a16="http://schemas.microsoft.com/office/drawing/2014/main" id="{7128926A-A42F-EA80-C1F8-C721A6854E40}"/>
-              </a:ext>
-            </a:extLst>
-          </p:cNvPr>
-          <p:cNvSpPr>
-            <a:spLocks noGrp="1"/>
-          </p:cNvSpPr>
-          <p:nvPr>
-            <p:ph idx="1"/>
-          </p:nvPr>
-        </p:nvSpPr>
-        <p:spPr>
-          <a:xfrm>
-            <a:off x="6796844" y="2767953"/>
-            <a:ext cx="4563883" cy="3461013"/>
-          </a:xfrm>
-        </p:spPr>
-        <p:txBody>
-          <a:bodyPr vert="horz" lIns="91440" tIns="45720" rIns="91440" bIns="45720" rtlCol="0">
-            <a:normAutofit/>
-          </a:bodyPr>
-          <a:lstStyle/>
-          <a:p>
-            <a:pPr>
-              <a:lnSpc>
-                <a:spcPct val="110000"/>
-              </a:lnSpc>
-            </a:pPr>
-            <a:r>
-              <a:rPr lang="pl-PL" sz="1800" dirty="0"/>
-              <a:t>Klauzula </a:t>
-            </a:r>
-            <a:r>
-              <a:rPr lang="pl-PL" sz="1800" b="1" dirty="0"/>
-              <a:t>„FROM”</a:t>
-            </a:r>
-            <a:r>
-              <a:rPr lang="pl-PL" sz="1800" dirty="0"/>
-              <a:t> określa z której tabeli (lub tabel) baza danych ma pobrać dane. Klauzula </a:t>
-            </a:r>
-            <a:r>
-              <a:rPr lang="pl-PL" sz="1800" b="1" dirty="0"/>
-              <a:t>„WHERE”</a:t>
-            </a:r>
-            <a:r>
-              <a:rPr lang="pl-PL" sz="1800" dirty="0"/>
-              <a:t> jest używana do filtrowania rekordów zgodnie z określonym kryterium.</a:t>
-            </a:r>
-          </a:p>
-        </p:txBody>
-      </p:sp>
-    </p:spTree>
-    <p:extLst>
-      <p:ext uri="{BB962C8B-B14F-4D97-AF65-F5344CB8AC3E}">
-        <p14:creationId xmlns:p14="http://schemas.microsoft.com/office/powerpoint/2010/main" val="2913523551"/>
       </p:ext>
     </p:extLst>
   </p:cSld>

</xml_diff>